<commit_message>
added ad to pptx
</commit_message>
<xml_diff>
--- a/Practical Inversion Of Control.pptx
+++ b/Practical Inversion Of Control.pptx
@@ -5,7 +5,7 @@
     <p:sldMasterId id="2147483648" r:id="rId1"/>
   </p:sldMasterIdLst>
   <p:notesMasterIdLst>
-    <p:notesMasterId r:id="rId25"/>
+    <p:notesMasterId r:id="rId26"/>
   </p:notesMasterIdLst>
   <p:sldIdLst>
     <p:sldId id="256" r:id="rId2"/>
@@ -31,6 +31,7 @@
     <p:sldId id="277" r:id="rId22"/>
     <p:sldId id="275" r:id="rId23"/>
     <p:sldId id="281" r:id="rId24"/>
+    <p:sldId id="283" r:id="rId25"/>
   </p:sldIdLst>
   <p:sldSz cx="9144000" cy="6858000" type="screen4x3"/>
   <p:notesSz cx="6858000" cy="9144000"/>
@@ -215,7 +216,7 @@
             <a:fld id="{68C2200B-4DF5-4B43-97DF-553A509DFD1B}" type="datetimeFigureOut">
               <a:rPr lang="en-US" smtClean="0"/>
               <a:pPr/>
-              <a:t>5/29/2009</a:t>
+              <a:t>5/30/2009</a:t>
             </a:fld>
             <a:endParaRPr lang="en-US"/>
           </a:p>
@@ -1081,11 +1082,7 @@
             </a:r>
             <a:r>
               <a:rPr lang="en-US" baseline="0" dirty="0" smtClean="0"/>
-              <a:t> </a:t>
-            </a:r>
-            <a:r>
-              <a:rPr lang="en-US" baseline="0" dirty="0" smtClean="0"/>
-              <a:t>live inside the IOC tool</a:t>
+              <a:t> live inside the IOC tool</a:t>
             </a:r>
           </a:p>
           <a:p>
@@ -2285,7 +2282,7 @@
             <a:fld id="{906B3CBC-F280-4D94-89D0-81AF5A06EAD7}" type="datetimeFigureOut">
               <a:rPr lang="en-US" smtClean="0"/>
               <a:pPr/>
-              <a:t>5/29/2009</a:t>
+              <a:t>5/30/2009</a:t>
             </a:fld>
             <a:endParaRPr lang="en-US"/>
           </a:p>
@@ -2452,7 +2449,7 @@
             <a:fld id="{906B3CBC-F280-4D94-89D0-81AF5A06EAD7}" type="datetimeFigureOut">
               <a:rPr lang="en-US" smtClean="0"/>
               <a:pPr/>
-              <a:t>5/29/2009</a:t>
+              <a:t>5/30/2009</a:t>
             </a:fld>
             <a:endParaRPr lang="en-US"/>
           </a:p>
@@ -2629,7 +2626,7 @@
             <a:fld id="{906B3CBC-F280-4D94-89D0-81AF5A06EAD7}" type="datetimeFigureOut">
               <a:rPr lang="en-US" smtClean="0"/>
               <a:pPr/>
-              <a:t>5/29/2009</a:t>
+              <a:t>5/30/2009</a:t>
             </a:fld>
             <a:endParaRPr lang="en-US"/>
           </a:p>
@@ -2796,7 +2793,7 @@
             <a:fld id="{906B3CBC-F280-4D94-89D0-81AF5A06EAD7}" type="datetimeFigureOut">
               <a:rPr lang="en-US" smtClean="0"/>
               <a:pPr/>
-              <a:t>5/29/2009</a:t>
+              <a:t>5/30/2009</a:t>
             </a:fld>
             <a:endParaRPr lang="en-US"/>
           </a:p>
@@ -3039,7 +3036,7 @@
             <a:fld id="{906B3CBC-F280-4D94-89D0-81AF5A06EAD7}" type="datetimeFigureOut">
               <a:rPr lang="en-US" smtClean="0"/>
               <a:pPr/>
-              <a:t>5/29/2009</a:t>
+              <a:t>5/30/2009</a:t>
             </a:fld>
             <a:endParaRPr lang="en-US"/>
           </a:p>
@@ -3324,7 +3321,7 @@
             <a:fld id="{906B3CBC-F280-4D94-89D0-81AF5A06EAD7}" type="datetimeFigureOut">
               <a:rPr lang="en-US" smtClean="0"/>
               <a:pPr/>
-              <a:t>5/29/2009</a:t>
+              <a:t>5/30/2009</a:t>
             </a:fld>
             <a:endParaRPr lang="en-US"/>
           </a:p>
@@ -3743,7 +3740,7 @@
             <a:fld id="{906B3CBC-F280-4D94-89D0-81AF5A06EAD7}" type="datetimeFigureOut">
               <a:rPr lang="en-US" smtClean="0"/>
               <a:pPr/>
-              <a:t>5/29/2009</a:t>
+              <a:t>5/30/2009</a:t>
             </a:fld>
             <a:endParaRPr lang="en-US"/>
           </a:p>
@@ -3858,7 +3855,7 @@
             <a:fld id="{906B3CBC-F280-4D94-89D0-81AF5A06EAD7}" type="datetimeFigureOut">
               <a:rPr lang="en-US" smtClean="0"/>
               <a:pPr/>
-              <a:t>5/29/2009</a:t>
+              <a:t>5/30/2009</a:t>
             </a:fld>
             <a:endParaRPr lang="en-US"/>
           </a:p>
@@ -3950,7 +3947,7 @@
             <a:fld id="{906B3CBC-F280-4D94-89D0-81AF5A06EAD7}" type="datetimeFigureOut">
               <a:rPr lang="en-US" smtClean="0"/>
               <a:pPr/>
-              <a:t>5/29/2009</a:t>
+              <a:t>5/30/2009</a:t>
             </a:fld>
             <a:endParaRPr lang="en-US"/>
           </a:p>
@@ -4224,7 +4221,7 @@
             <a:fld id="{906B3CBC-F280-4D94-89D0-81AF5A06EAD7}" type="datetimeFigureOut">
               <a:rPr lang="en-US" smtClean="0"/>
               <a:pPr/>
-              <a:t>5/29/2009</a:t>
+              <a:t>5/30/2009</a:t>
             </a:fld>
             <a:endParaRPr lang="en-US"/>
           </a:p>
@@ -4474,7 +4471,7 @@
             <a:fld id="{906B3CBC-F280-4D94-89D0-81AF5A06EAD7}" type="datetimeFigureOut">
               <a:rPr lang="en-US" smtClean="0"/>
               <a:pPr/>
-              <a:t>5/29/2009</a:t>
+              <a:t>5/30/2009</a:t>
             </a:fld>
             <a:endParaRPr lang="en-US"/>
           </a:p>
@@ -4684,7 +4681,7 @@
             <a:fld id="{906B3CBC-F280-4D94-89D0-81AF5A06EAD7}" type="datetimeFigureOut">
               <a:rPr lang="en-US" smtClean="0"/>
               <a:pPr/>
-              <a:t>5/29/2009</a:t>
+              <a:t>5/30/2009</a:t>
             </a:fld>
             <a:endParaRPr lang="en-US"/>
           </a:p>
@@ -5115,8 +5112,34 @@
           <a:p>
             <a:r>
               <a:rPr lang="en-US" dirty="0" smtClean="0"/>
-              <a:t>Matt Hinze</a:t>
-            </a:r>
+              <a:t>Matt </a:t>
+            </a:r>
+            <a:r>
+              <a:rPr lang="en-US" dirty="0" smtClean="0"/>
+              <a:t>Hinze</a:t>
+            </a:r>
+            <a:br>
+              <a:rPr lang="en-US" dirty="0" smtClean="0"/>
+            </a:br>
+            <a:r>
+              <a:rPr lang="en-US" dirty="0" smtClean="0"/>
+              <a:t>mhinze@</a:t>
+            </a:r>
+            <a:r>
+              <a:rPr lang="en-US" dirty="0" smtClean="0">
+                <a:solidFill>
+                  <a:srgbClr val="FFFF00"/>
+                </a:solidFill>
+              </a:rPr>
+              <a:t>headspringsystems</a:t>
+            </a:r>
+            <a:r>
+              <a:rPr lang="en-US" dirty="0" smtClean="0"/>
+              <a:t>.com</a:t>
+            </a:r>
+          </a:p>
+          <a:p>
+            <a:endParaRPr lang="en-US" dirty="0" smtClean="0"/>
           </a:p>
         </p:txBody>
       </p:sp>
@@ -6185,15 +6208,7 @@
           <a:p>
             <a:r>
               <a:rPr lang="en-US" dirty="0" smtClean="0"/>
-              <a:t>Don’t use the tool where you don’t need it, in </a:t>
-            </a:r>
-            <a:r>
-              <a:rPr lang="en-US" dirty="0" smtClean="0"/>
-              <a:t>unit tests </a:t>
-            </a:r>
-            <a:r>
-              <a:rPr lang="en-US" dirty="0" smtClean="0"/>
-              <a:t>for example.</a:t>
+              <a:t>Don’t use the tool where you don’t need it, in unit tests for example.</a:t>
             </a:r>
           </a:p>
           <a:p>
@@ -6226,11 +6241,7 @@
           <a:p>
             <a:r>
               <a:rPr lang="en-US" dirty="0" smtClean="0"/>
-              <a:t>Avoid magic </a:t>
-            </a:r>
-            <a:r>
-              <a:rPr lang="en-US" dirty="0" smtClean="0"/>
-              <a:t>strings; favor convention over configuration.</a:t>
+              <a:t>Avoid magic strings; favor convention over configuration.</a:t>
             </a:r>
           </a:p>
           <a:p>
@@ -6334,11 +6345,7 @@
           <a:p>
             <a:r>
               <a:rPr lang="en-US" dirty="0" smtClean="0"/>
-              <a:t>Jeremy </a:t>
-            </a:r>
-            <a:r>
-              <a:rPr lang="en-US" dirty="0" smtClean="0"/>
-              <a:t>Miller</a:t>
+              <a:t>Jeremy Miller</a:t>
             </a:r>
           </a:p>
           <a:p>
@@ -6361,6 +6368,179 @@
       </p:par>
     </p:tnLst>
   </p:timing>
+</p:sld>
+</file>
+
+<file path=ppt/slides/slide24.xml><?xml version="1.0" encoding="utf-8"?>
+<p:sld xmlns:a="http://schemas.openxmlformats.org/drawingml/2006/main" xmlns:r="http://schemas.openxmlformats.org/officeDocument/2006/relationships" xmlns:p="http://schemas.openxmlformats.org/presentationml/2006/main">
+  <p:cSld>
+    <p:bg>
+      <p:bgPr>
+        <a:blipFill dpi="0" rotWithShape="1">
+          <a:blip r:embed="rId2">
+            <a:lum/>
+          </a:blip>
+          <a:srcRect/>
+          <a:stretch>
+            <a:fillRect/>
+          </a:stretch>
+        </a:blipFill>
+        <a:effectLst/>
+      </p:bgPr>
+    </p:bg>
+    <p:spTree>
+      <p:nvGrpSpPr>
+        <p:cNvPr id="1" name=""/>
+        <p:cNvGrpSpPr/>
+        <p:nvPr/>
+      </p:nvGrpSpPr>
+      <p:grpSpPr>
+        <a:xfrm>
+          <a:off x="0" y="0"/>
+          <a:ext cx="0" cy="0"/>
+          <a:chOff x="0" y="0"/>
+          <a:chExt cx="0" cy="0"/>
+        </a:xfrm>
+      </p:grpSpPr>
+      <p:sp>
+        <p:nvSpPr>
+          <p:cNvPr id="2" name="Title 1"/>
+          <p:cNvSpPr>
+            <a:spLocks noGrp="1"/>
+          </p:cNvSpPr>
+          <p:nvPr>
+            <p:ph type="title"/>
+          </p:nvPr>
+        </p:nvSpPr>
+        <p:spPr/>
+        <p:txBody>
+          <a:bodyPr>
+            <a:normAutofit/>
+          </a:bodyPr>
+          <a:lstStyle/>
+          <a:p>
+            <a:r>
+              <a:rPr lang="en-US" sz="6600" dirty="0" smtClean="0">
+                <a:solidFill>
+                  <a:schemeClr val="bg1"/>
+                </a:solidFill>
+              </a:rPr>
+              <a:t>Faster, Better, Stronger</a:t>
+            </a:r>
+            <a:endParaRPr lang="en-US" sz="6600" dirty="0">
+              <a:solidFill>
+                <a:schemeClr val="bg1"/>
+              </a:solidFill>
+            </a:endParaRPr>
+          </a:p>
+        </p:txBody>
+      </p:sp>
+      <p:sp>
+        <p:nvSpPr>
+          <p:cNvPr id="3" name="Content Placeholder 2"/>
+          <p:cNvSpPr>
+            <a:spLocks noGrp="1"/>
+          </p:cNvSpPr>
+          <p:nvPr>
+            <p:ph idx="1"/>
+          </p:nvPr>
+        </p:nvSpPr>
+        <p:spPr>
+          <a:xfrm>
+            <a:off x="457200" y="1905000"/>
+            <a:ext cx="8229600" cy="3124199"/>
+          </a:xfrm>
+        </p:spPr>
+        <p:txBody>
+          <a:bodyPr>
+            <a:normAutofit/>
+          </a:bodyPr>
+          <a:lstStyle/>
+          <a:p>
+            <a:r>
+              <a:rPr lang="en-US" sz="3600" u="sng" dirty="0" smtClean="0">
+                <a:solidFill>
+                  <a:srgbClr val="FFB64B"/>
+                </a:solidFill>
+              </a:rPr>
+              <a:t>http://headspringsystems.com/training</a:t>
+            </a:r>
+          </a:p>
+          <a:p>
+            <a:r>
+              <a:rPr lang="en-US" sz="3600" dirty="0" smtClean="0">
+                <a:solidFill>
+                  <a:srgbClr val="FFB64B"/>
+                </a:solidFill>
+              </a:rPr>
+              <a:t>Next course: June 10-12, 2009 (</a:t>
+            </a:r>
+            <a:r>
+              <a:rPr lang="en-US" sz="3600" dirty="0" smtClean="0">
+                <a:solidFill>
+                  <a:srgbClr val="FFB64B"/>
+                </a:solidFill>
+              </a:rPr>
+              <a:t>W, Th, </a:t>
+            </a:r>
+            <a:r>
+              <a:rPr lang="en-US" sz="3600" dirty="0" smtClean="0">
+                <a:solidFill>
+                  <a:srgbClr val="FFB64B"/>
+                </a:solidFill>
+              </a:rPr>
+              <a:t>F)</a:t>
+            </a:r>
+          </a:p>
+          <a:p>
+            <a:r>
+              <a:rPr lang="en-US" sz="3600" dirty="0" smtClean="0">
+                <a:solidFill>
+                  <a:srgbClr val="FFB64B"/>
+                </a:solidFill>
+              </a:rPr>
+              <a:t>25</a:t>
+            </a:r>
+            <a:r>
+              <a:rPr lang="en-US" sz="3600" dirty="0" smtClean="0">
+                <a:solidFill>
+                  <a:srgbClr val="FFB64B"/>
+                </a:solidFill>
+              </a:rPr>
+              <a:t>% discount: call </a:t>
+            </a:r>
+            <a:r>
+              <a:rPr lang="en-US" sz="3600" dirty="0" smtClean="0">
+                <a:solidFill>
+                  <a:srgbClr val="FFB64B"/>
+                </a:solidFill>
+              </a:rPr>
+              <a:t>512-459-2260 and give Talisha discount code ‘</a:t>
+            </a:r>
+            <a:r>
+              <a:rPr lang="en-US" sz="3600" i="1" dirty="0" smtClean="0">
+                <a:solidFill>
+                  <a:srgbClr val="FFB64B"/>
+                </a:solidFill>
+              </a:rPr>
+              <a:t>Hinze</a:t>
+            </a:r>
+            <a:r>
+              <a:rPr lang="en-US" sz="3600" dirty="0" smtClean="0">
+                <a:solidFill>
+                  <a:srgbClr val="FFB64B"/>
+                </a:solidFill>
+              </a:rPr>
+              <a:t>’</a:t>
+            </a:r>
+          </a:p>
+        </p:txBody>
+      </p:sp>
+    </p:spTree>
+  </p:cSld>
+  <p:clrMapOvr>
+    <a:masterClrMapping/>
+  </p:clrMapOvr>
 </p:sld>
 </file>
 

</xml_diff>